<commit_message>
added DOMModify and DOMQuery
</commit_message>
<xml_diff>
--- a/XMLTaskIRE699/XDMIRE699.pptx
+++ b/XMLTaskIRE699/XDMIRE699.pptx
@@ -244,7 +244,7 @@
           <a:p>
             <a:fld id="{BB22B364-8E8B-466A-94D4-5C1138C769AB}" type="datetimeFigureOut">
               <a:rPr lang="hu-HU" smtClean="0"/>
-              <a:t>2023. 11. 11.</a:t>
+              <a:t>2023. 11. 15.</a:t>
             </a:fld>
             <a:endParaRPr lang="hu-HU"/>
           </a:p>
@@ -414,7 +414,7 @@
           <a:p>
             <a:fld id="{BB22B364-8E8B-466A-94D4-5C1138C769AB}" type="datetimeFigureOut">
               <a:rPr lang="hu-HU" smtClean="0"/>
-              <a:t>2023. 11. 11.</a:t>
+              <a:t>2023. 11. 15.</a:t>
             </a:fld>
             <a:endParaRPr lang="hu-HU"/>
           </a:p>
@@ -594,7 +594,7 @@
           <a:p>
             <a:fld id="{BB22B364-8E8B-466A-94D4-5C1138C769AB}" type="datetimeFigureOut">
               <a:rPr lang="hu-HU" smtClean="0"/>
-              <a:t>2023. 11. 11.</a:t>
+              <a:t>2023. 11. 15.</a:t>
             </a:fld>
             <a:endParaRPr lang="hu-HU"/>
           </a:p>
@@ -764,7 +764,7 @@
           <a:p>
             <a:fld id="{BB22B364-8E8B-466A-94D4-5C1138C769AB}" type="datetimeFigureOut">
               <a:rPr lang="hu-HU" smtClean="0"/>
-              <a:t>2023. 11. 11.</a:t>
+              <a:t>2023. 11. 15.</a:t>
             </a:fld>
             <a:endParaRPr lang="hu-HU"/>
           </a:p>
@@ -1008,7 +1008,7 @@
           <a:p>
             <a:fld id="{BB22B364-8E8B-466A-94D4-5C1138C769AB}" type="datetimeFigureOut">
               <a:rPr lang="hu-HU" smtClean="0"/>
-              <a:t>2023. 11. 11.</a:t>
+              <a:t>2023. 11. 15.</a:t>
             </a:fld>
             <a:endParaRPr lang="hu-HU"/>
           </a:p>
@@ -1240,7 +1240,7 @@
           <a:p>
             <a:fld id="{BB22B364-8E8B-466A-94D4-5C1138C769AB}" type="datetimeFigureOut">
               <a:rPr lang="hu-HU" smtClean="0"/>
-              <a:t>2023. 11. 11.</a:t>
+              <a:t>2023. 11. 15.</a:t>
             </a:fld>
             <a:endParaRPr lang="hu-HU"/>
           </a:p>
@@ -1607,7 +1607,7 @@
           <a:p>
             <a:fld id="{BB22B364-8E8B-466A-94D4-5C1138C769AB}" type="datetimeFigureOut">
               <a:rPr lang="hu-HU" smtClean="0"/>
-              <a:t>2023. 11. 11.</a:t>
+              <a:t>2023. 11. 15.</a:t>
             </a:fld>
             <a:endParaRPr lang="hu-HU"/>
           </a:p>
@@ -1725,7 +1725,7 @@
           <a:p>
             <a:fld id="{BB22B364-8E8B-466A-94D4-5C1138C769AB}" type="datetimeFigureOut">
               <a:rPr lang="hu-HU" smtClean="0"/>
-              <a:t>2023. 11. 11.</a:t>
+              <a:t>2023. 11. 15.</a:t>
             </a:fld>
             <a:endParaRPr lang="hu-HU"/>
           </a:p>
@@ -1820,7 +1820,7 @@
           <a:p>
             <a:fld id="{BB22B364-8E8B-466A-94D4-5C1138C769AB}" type="datetimeFigureOut">
               <a:rPr lang="hu-HU" smtClean="0"/>
-              <a:t>2023. 11. 11.</a:t>
+              <a:t>2023. 11. 15.</a:t>
             </a:fld>
             <a:endParaRPr lang="hu-HU"/>
           </a:p>
@@ -2097,7 +2097,7 @@
           <a:p>
             <a:fld id="{BB22B364-8E8B-466A-94D4-5C1138C769AB}" type="datetimeFigureOut">
               <a:rPr lang="hu-HU" smtClean="0"/>
-              <a:t>2023. 11. 11.</a:t>
+              <a:t>2023. 11. 15.</a:t>
             </a:fld>
             <a:endParaRPr lang="hu-HU"/>
           </a:p>
@@ -2354,7 +2354,7 @@
           <a:p>
             <a:fld id="{BB22B364-8E8B-466A-94D4-5C1138C769AB}" type="datetimeFigureOut">
               <a:rPr lang="hu-HU" smtClean="0"/>
-              <a:t>2023. 11. 11.</a:t>
+              <a:t>2023. 11. 15.</a:t>
             </a:fld>
             <a:endParaRPr lang="hu-HU"/>
           </a:p>
@@ -2567,7 +2567,7 @@
           <a:p>
             <a:fld id="{BB22B364-8E8B-466A-94D4-5C1138C769AB}" type="datetimeFigureOut">
               <a:rPr lang="hu-HU" smtClean="0"/>
-              <a:t>2023. 11. 11.</a:t>
+              <a:t>2023. 11. 15.</a:t>
             </a:fld>
             <a:endParaRPr lang="hu-HU"/>
           </a:p>
@@ -2974,10 +2974,10 @@
       </p:grpSpPr>
       <p:grpSp>
         <p:nvGrpSpPr>
-          <p:cNvPr id="3" name="Csoportba foglalás 2">
+          <p:cNvPr id="16" name="Csoportba foglalás 15">
             <a:extLst>
               <a:ext uri="{FF2B5EF4-FFF2-40B4-BE49-F238E27FC236}">
-                <a16:creationId xmlns:a16="http://schemas.microsoft.com/office/drawing/2014/main" id="{05D11F68-303B-5841-9064-20E65CA3D8C1}"/>
+                <a16:creationId xmlns:a16="http://schemas.microsoft.com/office/drawing/2014/main" id="{6374552A-10BB-CB4C-89AB-2DE6A216C3B7}"/>
               </a:ext>
             </a:extLst>
           </p:cNvPr>
@@ -4049,7 +4049,7 @@
             <a:prstGeom prst="line">
               <a:avLst/>
             </a:prstGeom>
-            <a:ln w="76200">
+            <a:ln w="57150">
               <a:solidFill>
                 <a:schemeClr val="tx1"/>
               </a:solidFill>
@@ -4094,7 +4094,7 @@
             <a:prstGeom prst="line">
               <a:avLst/>
             </a:prstGeom>
-            <a:ln w="76200">
+            <a:ln w="57150">
               <a:solidFill>
                 <a:schemeClr val="tx1"/>
               </a:solidFill>
@@ -4139,7 +4139,7 @@
             <a:prstGeom prst="line">
               <a:avLst/>
             </a:prstGeom>
-            <a:ln w="76200">
+            <a:ln w="57150">
               <a:solidFill>
                 <a:schemeClr val="tx1"/>
               </a:solidFill>
@@ -4184,7 +4184,7 @@
             <a:prstGeom prst="line">
               <a:avLst/>
             </a:prstGeom>
-            <a:ln w="76200">
+            <a:ln w="57150">
               <a:solidFill>
                 <a:schemeClr val="tx1"/>
               </a:solidFill>
@@ -4229,7 +4229,7 @@
             <a:prstGeom prst="line">
               <a:avLst/>
             </a:prstGeom>
-            <a:ln w="76200">
+            <a:ln w="57150">
               <a:solidFill>
                 <a:schemeClr val="tx1"/>
               </a:solidFill>
@@ -4274,7 +4274,7 @@
             <a:prstGeom prst="line">
               <a:avLst/>
             </a:prstGeom>
-            <a:ln w="76200">
+            <a:ln w="57150">
               <a:solidFill>
                 <a:schemeClr val="tx1"/>
               </a:solidFill>
@@ -4319,7 +4319,7 @@
             <a:prstGeom prst="line">
               <a:avLst/>
             </a:prstGeom>
-            <a:ln w="76200">
+            <a:ln w="57150">
               <a:solidFill>
                 <a:schemeClr val="tx1"/>
               </a:solidFill>
@@ -4574,7 +4574,7 @@
             <a:prstGeom prst="line">
               <a:avLst/>
             </a:prstGeom>
-            <a:ln w="76200">
+            <a:ln w="57150">
               <a:solidFill>
                 <a:schemeClr val="tx1"/>
               </a:solidFill>
@@ -4619,7 +4619,7 @@
             <a:prstGeom prst="line">
               <a:avLst/>
             </a:prstGeom>
-            <a:ln w="76200">
+            <a:ln w="57150">
               <a:solidFill>
                 <a:schemeClr val="tx1"/>
               </a:solidFill>
@@ -4664,7 +4664,7 @@
             <a:prstGeom prst="line">
               <a:avLst/>
             </a:prstGeom>
-            <a:ln w="76200">
+            <a:ln w="57150">
               <a:solidFill>
                 <a:schemeClr val="tx1"/>
               </a:solidFill>
@@ -4709,7 +4709,7 @@
             <a:prstGeom prst="line">
               <a:avLst/>
             </a:prstGeom>
-            <a:ln w="76200">
+            <a:ln w="57150">
               <a:solidFill>
                 <a:schemeClr val="tx1"/>
               </a:solidFill>
@@ -4754,7 +4754,7 @@
             <a:prstGeom prst="line">
               <a:avLst/>
             </a:prstGeom>
-            <a:ln w="76200">
+            <a:ln w="57150">
               <a:solidFill>
                 <a:schemeClr val="tx1"/>
               </a:solidFill>
@@ -4907,7 +4907,7 @@
             <a:prstGeom prst="line">
               <a:avLst/>
             </a:prstGeom>
-            <a:ln w="76200">
+            <a:ln w="57150">
               <a:solidFill>
                 <a:schemeClr val="tx1"/>
               </a:solidFill>
@@ -4952,7 +4952,7 @@
             <a:prstGeom prst="line">
               <a:avLst/>
             </a:prstGeom>
-            <a:ln w="76200">
+            <a:ln w="57150">
               <a:solidFill>
                 <a:schemeClr val="tx1"/>
               </a:solidFill>
@@ -4997,7 +4997,7 @@
             <a:prstGeom prst="line">
               <a:avLst/>
             </a:prstGeom>
-            <a:ln w="76200">
+            <a:ln w="57150">
               <a:solidFill>
                 <a:schemeClr val="tx1"/>
               </a:solidFill>
@@ -5520,7 +5520,7 @@
             <a:prstGeom prst="line">
               <a:avLst/>
             </a:prstGeom>
-            <a:ln w="76200">
+            <a:ln w="57150">
               <a:solidFill>
                 <a:schemeClr val="tx1"/>
               </a:solidFill>
@@ -5565,7 +5565,7 @@
             <a:prstGeom prst="line">
               <a:avLst/>
             </a:prstGeom>
-            <a:ln w="76200">
+            <a:ln w="57150">
               <a:solidFill>
                 <a:schemeClr val="tx1"/>
               </a:solidFill>
@@ -5610,7 +5610,7 @@
             <a:prstGeom prst="line">
               <a:avLst/>
             </a:prstGeom>
-            <a:ln w="76200">
+            <a:ln w="57150">
               <a:solidFill>
                 <a:schemeClr val="tx1"/>
               </a:solidFill>
@@ -5655,7 +5655,7 @@
             <a:prstGeom prst="line">
               <a:avLst/>
             </a:prstGeom>
-            <a:ln w="76200">
+            <a:ln w="57150">
               <a:solidFill>
                 <a:schemeClr val="tx1"/>
               </a:solidFill>
@@ -5700,7 +5700,7 @@
             <a:prstGeom prst="line">
               <a:avLst/>
             </a:prstGeom>
-            <a:ln w="76200">
+            <a:ln w="57150">
               <a:solidFill>
                 <a:schemeClr val="tx1"/>
               </a:solidFill>
@@ -5970,7 +5970,7 @@
             <a:prstGeom prst="line">
               <a:avLst/>
             </a:prstGeom>
-            <a:ln w="76200">
+            <a:ln w="57150">
               <a:solidFill>
                 <a:schemeClr val="tx1"/>
               </a:solidFill>
@@ -6015,7 +6015,7 @@
             <a:prstGeom prst="line">
               <a:avLst/>
             </a:prstGeom>
-            <a:ln w="76200">
+            <a:ln w="57150">
               <a:solidFill>
                 <a:schemeClr val="tx1"/>
               </a:solidFill>
@@ -6060,7 +6060,7 @@
             <a:prstGeom prst="line">
               <a:avLst/>
             </a:prstGeom>
-            <a:ln w="76200">
+            <a:ln w="57150">
               <a:solidFill>
                 <a:schemeClr val="tx1"/>
               </a:solidFill>
@@ -6571,7 +6571,7 @@
             <a:prstGeom prst="line">
               <a:avLst/>
             </a:prstGeom>
-            <a:ln w="76200">
+            <a:ln w="57150">
               <a:solidFill>
                 <a:schemeClr val="tx1"/>
               </a:solidFill>
@@ -6616,7 +6616,7 @@
             <a:prstGeom prst="line">
               <a:avLst/>
             </a:prstGeom>
-            <a:ln w="76200">
+            <a:ln w="57150">
               <a:solidFill>
                 <a:schemeClr val="tx1"/>
               </a:solidFill>
@@ -6661,7 +6661,7 @@
             <a:prstGeom prst="line">
               <a:avLst/>
             </a:prstGeom>
-            <a:ln w="76200">
+            <a:ln w="57150">
               <a:solidFill>
                 <a:schemeClr val="tx1"/>
               </a:solidFill>
@@ -6706,7 +6706,7 @@
             <a:prstGeom prst="line">
               <a:avLst/>
             </a:prstGeom>
-            <a:ln w="76200">
+            <a:ln w="57150">
               <a:solidFill>
                 <a:schemeClr val="tx1"/>
               </a:solidFill>
@@ -6859,7 +6859,7 @@
             <a:prstGeom prst="line">
               <a:avLst/>
             </a:prstGeom>
-            <a:ln w="76200">
+            <a:ln w="57150">
               <a:solidFill>
                 <a:schemeClr val="tx1"/>
               </a:solidFill>
@@ -6904,7 +6904,7 @@
             <a:prstGeom prst="line">
               <a:avLst/>
             </a:prstGeom>
-            <a:ln w="76200">
+            <a:ln w="57150">
               <a:solidFill>
                 <a:schemeClr val="tx1"/>
               </a:solidFill>
@@ -7217,7 +7217,7 @@
             <a:prstGeom prst="line">
               <a:avLst/>
             </a:prstGeom>
-            <a:ln w="76200">
+            <a:ln w="57150">
               <a:solidFill>
                 <a:schemeClr val="tx1"/>
               </a:solidFill>
@@ -7262,7 +7262,7 @@
             <a:prstGeom prst="line">
               <a:avLst/>
             </a:prstGeom>
-            <a:ln w="76200">
+            <a:ln w="57150">
               <a:solidFill>
                 <a:schemeClr val="tx1"/>
               </a:solidFill>
@@ -7361,7 +7361,7 @@
             <a:prstGeom prst="line">
               <a:avLst/>
             </a:prstGeom>
-            <a:ln w="76200">
+            <a:ln w="57150">
               <a:solidFill>
                 <a:schemeClr val="tx1"/>
               </a:solidFill>
@@ -7586,7 +7586,7 @@
             <a:prstGeom prst="line">
               <a:avLst/>
             </a:prstGeom>
-            <a:ln w="76200">
+            <a:ln w="57150">
               <a:solidFill>
                 <a:schemeClr val="tx1"/>
               </a:solidFill>
@@ -7631,7 +7631,7 @@
             <a:prstGeom prst="line">
               <a:avLst/>
             </a:prstGeom>
-            <a:ln w="76200">
+            <a:ln w="57150">
               <a:solidFill>
                 <a:schemeClr val="tx1"/>
               </a:solidFill>
@@ -7676,7 +7676,7 @@
             <a:prstGeom prst="line">
               <a:avLst/>
             </a:prstGeom>
-            <a:ln w="76200">
+            <a:ln w="57150">
               <a:solidFill>
                 <a:schemeClr val="tx1"/>
               </a:solidFill>
@@ -7721,7 +7721,7 @@
             <a:prstGeom prst="line">
               <a:avLst/>
             </a:prstGeom>
-            <a:ln w="76200">
+            <a:ln w="57150">
               <a:solidFill>
                 <a:schemeClr val="tx1"/>
               </a:solidFill>
@@ -7844,7 +7844,7 @@
             <a:prstGeom prst="line">
               <a:avLst/>
             </a:prstGeom>
-            <a:ln w="76200">
+            <a:ln w="57150">
               <a:solidFill>
                 <a:schemeClr val="tx1"/>
               </a:solidFill>
@@ -8009,7 +8009,7 @@
             <a:prstGeom prst="line">
               <a:avLst/>
             </a:prstGeom>
-            <a:ln w="76200">
+            <a:ln w="57150">
               <a:solidFill>
                 <a:schemeClr val="tx1"/>
               </a:solidFill>
@@ -8249,7 +8249,7 @@
             <a:prstGeom prst="line">
               <a:avLst/>
             </a:prstGeom>
-            <a:ln w="76200">
+            <a:ln w="57150">
               <a:solidFill>
                 <a:schemeClr val="tx1"/>
               </a:solidFill>
@@ -8360,7 +8360,7 @@
             <a:prstGeom prst="line">
               <a:avLst/>
             </a:prstGeom>
-            <a:ln w="76200">
+            <a:ln w="57150">
               <a:solidFill>
                 <a:schemeClr val="tx1"/>
               </a:solidFill>
@@ -8600,7 +8600,7 @@
             <a:prstGeom prst="line">
               <a:avLst/>
             </a:prstGeom>
-            <a:ln w="76200">
+            <a:ln w="57150">
               <a:solidFill>
                 <a:schemeClr val="tx1"/>
               </a:solidFill>
@@ -8711,7 +8711,7 @@
             <a:prstGeom prst="line">
               <a:avLst/>
             </a:prstGeom>
-            <a:ln w="76200">
+            <a:ln w="57150">
               <a:solidFill>
                 <a:schemeClr val="tx1"/>
               </a:solidFill>
@@ -8888,7 +8888,7 @@
             <a:prstGeom prst="line">
               <a:avLst/>
             </a:prstGeom>
-            <a:ln w="76200">
+            <a:ln w="57150">
               <a:solidFill>
                 <a:schemeClr val="tx1"/>
               </a:solidFill>
@@ -9065,7 +9065,7 @@
             <a:prstGeom prst="line">
               <a:avLst/>
             </a:prstGeom>
-            <a:ln w="76200">
+            <a:ln w="57150">
               <a:solidFill>
                 <a:schemeClr val="tx1"/>
               </a:solidFill>
@@ -9110,7 +9110,7 @@
             <a:prstGeom prst="line">
               <a:avLst/>
             </a:prstGeom>
-            <a:ln w="76200">
+            <a:ln w="57150">
               <a:solidFill>
                 <a:schemeClr val="tx1"/>
               </a:solidFill>
@@ -9155,7 +9155,7 @@
             <a:prstGeom prst="line">
               <a:avLst/>
             </a:prstGeom>
-            <a:ln w="76200">
+            <a:ln w="57150">
               <a:solidFill>
                 <a:schemeClr val="tx1"/>
               </a:solidFill>
@@ -9395,7 +9395,7 @@
             <a:prstGeom prst="line">
               <a:avLst/>
             </a:prstGeom>
-            <a:ln w="76200">
+            <a:ln w="57150">
               <a:solidFill>
                 <a:schemeClr val="tx1"/>
               </a:solidFill>
@@ -9506,7 +9506,7 @@
             <a:prstGeom prst="line">
               <a:avLst/>
             </a:prstGeom>
-            <a:ln w="76200">
+            <a:ln w="57150">
               <a:solidFill>
                 <a:schemeClr val="tx1"/>
               </a:solidFill>
@@ -9683,7 +9683,7 @@
             <a:prstGeom prst="line">
               <a:avLst/>
             </a:prstGeom>
-            <a:ln w="76200">
+            <a:ln w="57150">
               <a:solidFill>
                 <a:schemeClr val="tx1"/>
               </a:solidFill>
@@ -9728,7 +9728,7 @@
             <a:prstGeom prst="line">
               <a:avLst/>
             </a:prstGeom>
-            <a:ln w="76200">
+            <a:ln w="57150">
               <a:solidFill>
                 <a:schemeClr val="tx1"/>
               </a:solidFill>
@@ -9773,7 +9773,7 @@
             <a:prstGeom prst="line">
               <a:avLst/>
             </a:prstGeom>
-            <a:ln w="76200">
+            <a:ln w="57150">
               <a:solidFill>
                 <a:schemeClr val="tx1"/>
               </a:solidFill>
@@ -9818,7 +9818,7 @@
             <a:prstGeom prst="line">
               <a:avLst/>
             </a:prstGeom>
-            <a:ln w="76200">
+            <a:ln w="57150">
               <a:solidFill>
                 <a:schemeClr val="tx1"/>
               </a:solidFill>
@@ -9863,7 +9863,7 @@
             <a:prstGeom prst="line">
               <a:avLst/>
             </a:prstGeom>
-            <a:ln w="76200">
+            <a:ln w="57150">
               <a:solidFill>
                 <a:schemeClr val="tx1"/>
               </a:solidFill>
@@ -9908,7 +9908,7 @@
             <a:prstGeom prst="line">
               <a:avLst/>
             </a:prstGeom>
-            <a:ln w="76200">
+            <a:ln w="57150">
               <a:solidFill>
                 <a:schemeClr val="tx1"/>
               </a:solidFill>
@@ -9953,7 +9953,7 @@
             <a:prstGeom prst="line">
               <a:avLst/>
             </a:prstGeom>
-            <a:ln w="76200">
+            <a:ln w="57150">
               <a:solidFill>
                 <a:schemeClr val="tx1"/>
               </a:solidFill>
@@ -9998,7 +9998,7 @@
             <a:prstGeom prst="line">
               <a:avLst/>
             </a:prstGeom>
-            <a:ln w="76200">
+            <a:ln w="57150">
               <a:solidFill>
                 <a:schemeClr val="tx1"/>
               </a:solidFill>
@@ -10043,7 +10043,7 @@
             <a:prstGeom prst="line">
               <a:avLst/>
             </a:prstGeom>
-            <a:ln w="76200">
+            <a:ln w="57150">
               <a:solidFill>
                 <a:schemeClr val="tx1"/>
               </a:solidFill>
@@ -10088,7 +10088,7 @@
             <a:prstGeom prst="line">
               <a:avLst/>
             </a:prstGeom>
-            <a:ln w="76200">
+            <a:ln w="57150">
               <a:solidFill>
                 <a:schemeClr val="tx1"/>
               </a:solidFill>
@@ -10660,9 +10660,9 @@
             <p:nvPr/>
           </p:nvCxnSpPr>
           <p:spPr>
-            <a:xfrm>
-              <a:off x="33958879" y="18050768"/>
-              <a:ext cx="12701" cy="3283780"/>
+            <a:xfrm flipH="1">
+              <a:off x="34161361" y="17843108"/>
+              <a:ext cx="22328" cy="3548502"/>
             </a:xfrm>
             <a:prstGeom prst="line">
               <a:avLst/>
@@ -10705,8 +10705,8 @@
           </p:nvCxnSpPr>
           <p:spPr>
             <a:xfrm>
-              <a:off x="33971580" y="21353853"/>
-              <a:ext cx="7094362" cy="28796"/>
+              <a:off x="34161361" y="21362479"/>
+              <a:ext cx="6904581" cy="20170"/>
             </a:xfrm>
             <a:prstGeom prst="line">
               <a:avLst/>
@@ -10748,9 +10748,9 @@
             <p:nvPr/>
           </p:nvCxnSpPr>
           <p:spPr>
-            <a:xfrm flipH="1">
-              <a:off x="33120027" y="18069769"/>
-              <a:ext cx="851553" cy="0"/>
+            <a:xfrm flipH="1" flipV="1">
+              <a:off x="33780413" y="17519184"/>
+              <a:ext cx="409012" cy="323924"/>
             </a:xfrm>
             <a:prstGeom prst="straightConnector1">
               <a:avLst/>
@@ -11149,7 +11149,7 @@
           <p:spPr>
             <a:xfrm>
               <a:off x="-22964422" y="23647400"/>
-              <a:ext cx="91128208" cy="0"/>
+              <a:ext cx="91340982" cy="0"/>
             </a:xfrm>
             <a:prstGeom prst="line">
               <a:avLst/>
@@ -11187,14 +11187,13 @@
             </p:cNvPr>
             <p:cNvCxnSpPr>
               <a:cxnSpLocks/>
-              <a:endCxn id="46" idx="2"/>
             </p:cNvCxnSpPr>
             <p:nvPr/>
           </p:nvCxnSpPr>
           <p:spPr>
             <a:xfrm flipH="1" flipV="1">
-              <a:off x="67198508" y="17875582"/>
-              <a:ext cx="969884" cy="9973"/>
+              <a:off x="67880685" y="17271017"/>
+              <a:ext cx="394515" cy="528402"/>
             </a:xfrm>
             <a:prstGeom prst="straightConnector1">
               <a:avLst/>
@@ -11238,8 +11237,8 @@
           </p:nvCxnSpPr>
           <p:spPr>
             <a:xfrm>
-              <a:off x="68163786" y="17861466"/>
-              <a:ext cx="0" cy="5785934"/>
+              <a:off x="68275200" y="17843108"/>
+              <a:ext cx="101360" cy="5804292"/>
             </a:xfrm>
             <a:prstGeom prst="line">
               <a:avLst/>
@@ -11290,7 +11289,7 @@
             <a:prstGeom prst="line">
               <a:avLst/>
             </a:prstGeom>
-            <a:ln w="76200">
+            <a:ln w="57150">
               <a:solidFill>
                 <a:schemeClr val="tx1"/>
               </a:solidFill>

</xml_diff>